<commit_message>
Se comenzo con el codigo parcial 2
</commit_message>
<xml_diff>
--- a/practica2/documentacion.pptx
+++ b/practica2/documentacion.pptx
@@ -9,10 +9,12 @@
     <p:sldId id="257" r:id="rId3"/>
     <p:sldId id="258" r:id="rId4"/>
     <p:sldId id="259" r:id="rId5"/>
-    <p:sldId id="260" r:id="rId6"/>
-    <p:sldId id="261" r:id="rId7"/>
-    <p:sldId id="262" r:id="rId8"/>
-    <p:sldId id="263" r:id="rId9"/>
+    <p:sldId id="264" r:id="rId6"/>
+    <p:sldId id="260" r:id="rId7"/>
+    <p:sldId id="261" r:id="rId8"/>
+    <p:sldId id="265" r:id="rId9"/>
+    <p:sldId id="262" r:id="rId10"/>
+    <p:sldId id="263" r:id="rId11"/>
   </p:sldIdLst>
   <p:sldSz cx="12192000" cy="6858000"/>
   <p:notesSz cx="6858000" cy="9144000"/>
@@ -111,6 +113,11 @@
       </a:defRPr>
     </a:lvl9pPr>
   </p:defaultTextStyle>
+  <p:extLst>
+    <p:ext uri="{EFAFB233-063F-42B5-8137-9DF3F51BA10A}">
+      <p15:sldGuideLst xmlns:p15="http://schemas.microsoft.com/office/powerpoint/2012/main"/>
+    </p:ext>
+  </p:extLst>
 </p:presentation>
 </file>
 
@@ -263,7 +270,7 @@
           <a:p>
             <a:fld id="{76170DAD-9B51-D64A-A8D6-154B69C8CB83}" type="datetimeFigureOut">
               <a:rPr lang="es-ES_tradnl" smtClean="0"/>
-              <a:t>25/3/19</a:t>
+              <a:t>27/3/19</a:t>
             </a:fld>
             <a:endParaRPr lang="es-ES_tradnl"/>
           </a:p>
@@ -463,7 +470,7 @@
           <a:p>
             <a:fld id="{76170DAD-9B51-D64A-A8D6-154B69C8CB83}" type="datetimeFigureOut">
               <a:rPr lang="es-ES_tradnl" smtClean="0"/>
-              <a:t>25/3/19</a:t>
+              <a:t>27/3/19</a:t>
             </a:fld>
             <a:endParaRPr lang="es-ES_tradnl"/>
           </a:p>
@@ -673,7 +680,7 @@
           <a:p>
             <a:fld id="{76170DAD-9B51-D64A-A8D6-154B69C8CB83}" type="datetimeFigureOut">
               <a:rPr lang="es-ES_tradnl" smtClean="0"/>
-              <a:t>25/3/19</a:t>
+              <a:t>27/3/19</a:t>
             </a:fld>
             <a:endParaRPr lang="es-ES_tradnl"/>
           </a:p>
@@ -873,7 +880,7 @@
           <a:p>
             <a:fld id="{76170DAD-9B51-D64A-A8D6-154B69C8CB83}" type="datetimeFigureOut">
               <a:rPr lang="es-ES_tradnl" smtClean="0"/>
-              <a:t>25/3/19</a:t>
+              <a:t>27/3/19</a:t>
             </a:fld>
             <a:endParaRPr lang="es-ES_tradnl"/>
           </a:p>
@@ -1149,7 +1156,7 @@
           <a:p>
             <a:fld id="{76170DAD-9B51-D64A-A8D6-154B69C8CB83}" type="datetimeFigureOut">
               <a:rPr lang="es-ES_tradnl" smtClean="0"/>
-              <a:t>25/3/19</a:t>
+              <a:t>27/3/19</a:t>
             </a:fld>
             <a:endParaRPr lang="es-ES_tradnl"/>
           </a:p>
@@ -1417,7 +1424,7 @@
           <a:p>
             <a:fld id="{76170DAD-9B51-D64A-A8D6-154B69C8CB83}" type="datetimeFigureOut">
               <a:rPr lang="es-ES_tradnl" smtClean="0"/>
-              <a:t>25/3/19</a:t>
+              <a:t>27/3/19</a:t>
             </a:fld>
             <a:endParaRPr lang="es-ES_tradnl"/>
           </a:p>
@@ -1832,7 +1839,7 @@
           <a:p>
             <a:fld id="{76170DAD-9B51-D64A-A8D6-154B69C8CB83}" type="datetimeFigureOut">
               <a:rPr lang="es-ES_tradnl" smtClean="0"/>
-              <a:t>25/3/19</a:t>
+              <a:t>27/3/19</a:t>
             </a:fld>
             <a:endParaRPr lang="es-ES_tradnl"/>
           </a:p>
@@ -1974,7 +1981,7 @@
           <a:p>
             <a:fld id="{76170DAD-9B51-D64A-A8D6-154B69C8CB83}" type="datetimeFigureOut">
               <a:rPr lang="es-ES_tradnl" smtClean="0"/>
-              <a:t>25/3/19</a:t>
+              <a:t>27/3/19</a:t>
             </a:fld>
             <a:endParaRPr lang="es-ES_tradnl"/>
           </a:p>
@@ -2087,7 +2094,7 @@
           <a:p>
             <a:fld id="{76170DAD-9B51-D64A-A8D6-154B69C8CB83}" type="datetimeFigureOut">
               <a:rPr lang="es-ES_tradnl" smtClean="0"/>
-              <a:t>25/3/19</a:t>
+              <a:t>27/3/19</a:t>
             </a:fld>
             <a:endParaRPr lang="es-ES_tradnl"/>
           </a:p>
@@ -2400,7 +2407,7 @@
           <a:p>
             <a:fld id="{76170DAD-9B51-D64A-A8D6-154B69C8CB83}" type="datetimeFigureOut">
               <a:rPr lang="es-ES_tradnl" smtClean="0"/>
-              <a:t>25/3/19</a:t>
+              <a:t>27/3/19</a:t>
             </a:fld>
             <a:endParaRPr lang="es-ES_tradnl"/>
           </a:p>
@@ -2689,7 +2696,7 @@
           <a:p>
             <a:fld id="{76170DAD-9B51-D64A-A8D6-154B69C8CB83}" type="datetimeFigureOut">
               <a:rPr lang="es-ES_tradnl" smtClean="0"/>
-              <a:t>25/3/19</a:t>
+              <a:t>27/3/19</a:t>
             </a:fld>
             <a:endParaRPr lang="es-ES_tradnl"/>
           </a:p>
@@ -2932,7 +2939,7 @@
           <a:p>
             <a:fld id="{76170DAD-9B51-D64A-A8D6-154B69C8CB83}" type="datetimeFigureOut">
               <a:rPr lang="es-ES_tradnl" smtClean="0"/>
-              <a:t>25/3/19</a:t>
+              <a:t>27/3/19</a:t>
             </a:fld>
             <a:endParaRPr lang="es-ES_tradnl"/>
           </a:p>
@@ -3415,6 +3422,204 @@
 </p:sld>
 </file>
 
+<file path=ppt/slides/slide10.xml><?xml version="1.0" encoding="utf-8"?>
+<p:sld xmlns:a="http://schemas.openxmlformats.org/drawingml/2006/main" xmlns:r="http://schemas.openxmlformats.org/officeDocument/2006/relationships" xmlns:p="http://schemas.openxmlformats.org/presentationml/2006/main">
+  <p:cSld>
+    <p:spTree>
+      <p:nvGrpSpPr>
+        <p:cNvPr id="1" name=""/>
+        <p:cNvGrpSpPr/>
+        <p:nvPr/>
+      </p:nvGrpSpPr>
+      <p:grpSpPr>
+        <a:xfrm>
+          <a:off x="0" y="0"/>
+          <a:ext cx="0" cy="0"/>
+          <a:chOff x="0" y="0"/>
+          <a:chExt cx="0" cy="0"/>
+        </a:xfrm>
+      </p:grpSpPr>
+      <p:sp>
+        <p:nvSpPr>
+          <p:cNvPr id="2" name="Title 1">
+            <a:extLst>
+              <a:ext uri="{FF2B5EF4-FFF2-40B4-BE49-F238E27FC236}">
+                <a16:creationId xmlns:a16="http://schemas.microsoft.com/office/drawing/2014/main" id="{DF646E62-D40B-974C-8013-6BC416D274F3}"/>
+              </a:ext>
+            </a:extLst>
+          </p:cNvPr>
+          <p:cNvSpPr>
+            <a:spLocks noGrp="1"/>
+          </p:cNvSpPr>
+          <p:nvPr>
+            <p:ph type="title"/>
+          </p:nvPr>
+        </p:nvSpPr>
+        <p:spPr/>
+        <p:txBody>
+          <a:bodyPr/>
+          <a:lstStyle/>
+          <a:p>
+            <a:r>
+              <a:rPr lang="es-ES_tradnl" dirty="0" err="1"/>
+              <a:t>Metodos</a:t>
+            </a:r>
+            <a:r>
+              <a:rPr lang="es-ES_tradnl" dirty="0"/>
+              <a:t> ensamble </a:t>
+            </a:r>
+          </a:p>
+        </p:txBody>
+      </p:sp>
+      <p:sp>
+        <p:nvSpPr>
+          <p:cNvPr id="3" name="Content Placeholder 2">
+            <a:extLst>
+              <a:ext uri="{FF2B5EF4-FFF2-40B4-BE49-F238E27FC236}">
+                <a16:creationId xmlns:a16="http://schemas.microsoft.com/office/drawing/2014/main" id="{F593C994-D8B0-B846-AE93-78B18623CCAB}"/>
+              </a:ext>
+            </a:extLst>
+          </p:cNvPr>
+          <p:cNvSpPr>
+            <a:spLocks noGrp="1"/>
+          </p:cNvSpPr>
+          <p:nvPr>
+            <p:ph idx="1"/>
+          </p:nvPr>
+        </p:nvSpPr>
+        <p:spPr/>
+        <p:txBody>
+          <a:bodyPr/>
+          <a:lstStyle/>
+          <a:p>
+            <a:r>
+              <a:rPr lang="es-ES_tradnl" dirty="0"/>
+              <a:t>Se </a:t>
+            </a:r>
+            <a:r>
+              <a:rPr lang="es-ES_tradnl" dirty="0" err="1"/>
+              <a:t>agragaron</a:t>
+            </a:r>
+            <a:r>
+              <a:rPr lang="es-ES_tradnl" dirty="0"/>
+              <a:t> métodos de redes neuronales MLP, </a:t>
+            </a:r>
+            <a:r>
+              <a:rPr lang="es-ES_tradnl" dirty="0" err="1"/>
+              <a:t>adaBoost</a:t>
+            </a:r>
+            <a:r>
+              <a:rPr lang="es-ES_tradnl" dirty="0"/>
+              <a:t>, </a:t>
+            </a:r>
+            <a:r>
+              <a:rPr lang="es-ES_tradnl" dirty="0" err="1"/>
+              <a:t>Bagging</a:t>
+            </a:r>
+            <a:r>
+              <a:rPr lang="es-ES_tradnl" dirty="0"/>
+              <a:t> y </a:t>
+            </a:r>
+            <a:r>
+              <a:rPr lang="es-ES_tradnl" dirty="0" err="1"/>
+              <a:t>random</a:t>
+            </a:r>
+            <a:r>
+              <a:rPr lang="es-ES_tradnl" dirty="0"/>
+              <a:t> </a:t>
+            </a:r>
+            <a:r>
+              <a:rPr lang="es-ES_tradnl" dirty="0" err="1"/>
+              <a:t>forest</a:t>
+            </a:r>
+            <a:r>
+              <a:rPr lang="es-ES_tradnl" dirty="0"/>
+              <a:t> obteniendo estos </a:t>
+            </a:r>
+            <a:r>
+              <a:rPr lang="es-ES_tradnl" dirty="0" err="1"/>
+              <a:t>reultados</a:t>
+            </a:r>
+            <a:r>
+              <a:rPr lang="es-ES_tradnl" dirty="0"/>
+              <a:t>, jugando un poco con las opciones de cada uno para mejorar el score</a:t>
+            </a:r>
+          </a:p>
+        </p:txBody>
+      </p:sp>
+      <p:pic>
+        <p:nvPicPr>
+          <p:cNvPr id="5" name="Picture 4">
+            <a:extLst>
+              <a:ext uri="{FF2B5EF4-FFF2-40B4-BE49-F238E27FC236}">
+                <a16:creationId xmlns:a16="http://schemas.microsoft.com/office/drawing/2014/main" id="{C7A71771-0873-6248-98AC-23218E0D780F}"/>
+              </a:ext>
+            </a:extLst>
+          </p:cNvPr>
+          <p:cNvPicPr>
+            <a:picLocks noChangeAspect="1"/>
+          </p:cNvPicPr>
+          <p:nvPr/>
+        </p:nvPicPr>
+        <p:blipFill>
+          <a:blip r:embed="rId2"/>
+          <a:stretch>
+            <a:fillRect/>
+          </a:stretch>
+        </p:blipFill>
+        <p:spPr>
+          <a:xfrm>
+            <a:off x="1019362" y="3186953"/>
+            <a:ext cx="5332625" cy="3145865"/>
+          </a:xfrm>
+          <a:prstGeom prst="rect">
+            <a:avLst/>
+          </a:prstGeom>
+        </p:spPr>
+      </p:pic>
+      <p:pic>
+        <p:nvPicPr>
+          <p:cNvPr id="7" name="Picture 6">
+            <a:extLst>
+              <a:ext uri="{FF2B5EF4-FFF2-40B4-BE49-F238E27FC236}">
+                <a16:creationId xmlns:a16="http://schemas.microsoft.com/office/drawing/2014/main" id="{85E58A1D-1225-AA47-AC6D-AB9952C5D03B}"/>
+              </a:ext>
+            </a:extLst>
+          </p:cNvPr>
+          <p:cNvPicPr>
+            <a:picLocks noChangeAspect="1"/>
+          </p:cNvPicPr>
+          <p:nvPr/>
+        </p:nvPicPr>
+        <p:blipFill>
+          <a:blip r:embed="rId3"/>
+          <a:stretch>
+            <a:fillRect/>
+          </a:stretch>
+        </p:blipFill>
+        <p:spPr>
+          <a:xfrm>
+            <a:off x="6803838" y="3604186"/>
+            <a:ext cx="4368800" cy="1155700"/>
+          </a:xfrm>
+          <a:prstGeom prst="rect">
+            <a:avLst/>
+          </a:prstGeom>
+        </p:spPr>
+      </p:pic>
+    </p:spTree>
+    <p:extLst>
+      <p:ext uri="{BB962C8B-B14F-4D97-AF65-F5344CB8AC3E}">
+        <p14:creationId xmlns:p14="http://schemas.microsoft.com/office/powerpoint/2010/main" val="3413398631"/>
+      </p:ext>
+    </p:extLst>
+  </p:cSld>
+  <p:clrMapOvr>
+    <a:masterClrMapping/>
+  </p:clrMapOvr>
+</p:sld>
+</file>
+
 <file path=ppt/slides/slide2.xml><?xml version="1.0" encoding="utf-8"?>
 <p:sld xmlns:a="http://schemas.openxmlformats.org/drawingml/2006/main" xmlns:r="http://schemas.openxmlformats.org/officeDocument/2006/relationships" xmlns:p="http://schemas.openxmlformats.org/presentationml/2006/main">
   <p:cSld>
@@ -3915,6 +4120,129 @@
           <p:cNvPr id="2" name="Title 1">
             <a:extLst>
               <a:ext uri="{FF2B5EF4-FFF2-40B4-BE49-F238E27FC236}">
+                <a16:creationId xmlns:a16="http://schemas.microsoft.com/office/drawing/2014/main" id="{C2A272E7-9A3F-FB47-A628-BB74CF0EF49D}"/>
+              </a:ext>
+            </a:extLst>
+          </p:cNvPr>
+          <p:cNvSpPr>
+            <a:spLocks noGrp="1"/>
+          </p:cNvSpPr>
+          <p:nvPr>
+            <p:ph type="title"/>
+          </p:nvPr>
+        </p:nvSpPr>
+        <p:spPr/>
+        <p:txBody>
+          <a:bodyPr/>
+          <a:lstStyle/>
+          <a:p>
+            <a:endParaRPr lang="es-ES_tradnl"/>
+          </a:p>
+        </p:txBody>
+      </p:sp>
+      <p:sp>
+        <p:nvSpPr>
+          <p:cNvPr id="3" name="Content Placeholder 2">
+            <a:extLst>
+              <a:ext uri="{FF2B5EF4-FFF2-40B4-BE49-F238E27FC236}">
+                <a16:creationId xmlns:a16="http://schemas.microsoft.com/office/drawing/2014/main" id="{C51EB199-4910-5640-BFDF-3CF5DC991FC2}"/>
+              </a:ext>
+            </a:extLst>
+          </p:cNvPr>
+          <p:cNvSpPr>
+            <a:spLocks noGrp="1"/>
+          </p:cNvSpPr>
+          <p:nvPr>
+            <p:ph idx="1"/>
+          </p:nvPr>
+        </p:nvSpPr>
+        <p:spPr/>
+        <p:txBody>
+          <a:bodyPr/>
+          <a:lstStyle/>
+          <a:p>
+            <a:r>
+              <a:rPr lang="es-ES_tradnl" dirty="0"/>
+              <a:t>Al remover los </a:t>
+            </a:r>
+            <a:r>
+              <a:rPr lang="es-ES_tradnl" dirty="0" err="1"/>
+              <a:t>outliers</a:t>
+            </a:r>
+            <a:r>
+              <a:rPr lang="es-ES_tradnl" dirty="0"/>
+              <a:t> me di cuenta que el algoritmo mejoro muchísimo, </a:t>
+            </a:r>
+            <a:r>
+              <a:rPr lang="es-ES_tradnl" dirty="0" err="1"/>
+              <a:t>comense</a:t>
+            </a:r>
+            <a:r>
+              <a:rPr lang="es-ES_tradnl" dirty="0"/>
+              <a:t> a jugar con las graficas para que quedaran tanto la </a:t>
+            </a:r>
+            <a:r>
+              <a:rPr lang="es-ES_tradnl" dirty="0" err="1"/>
+              <a:t>plotbox</a:t>
+            </a:r>
+            <a:r>
+              <a:rPr lang="es-ES_tradnl" dirty="0"/>
+              <a:t> como la </a:t>
+            </a:r>
+            <a:r>
+              <a:rPr lang="es-ES_tradnl" dirty="0" err="1"/>
+              <a:t>scaterplot</a:t>
+            </a:r>
+            <a:r>
+              <a:rPr lang="es-ES_tradnl" dirty="0"/>
+              <a:t> sin </a:t>
+            </a:r>
+            <a:r>
+              <a:rPr lang="es-ES_tradnl" dirty="0" err="1"/>
+              <a:t>outliers</a:t>
+            </a:r>
+            <a:r>
+              <a:rPr lang="es-ES_tradnl" dirty="0"/>
+              <a:t> </a:t>
+            </a:r>
+          </a:p>
+        </p:txBody>
+      </p:sp>
+    </p:spTree>
+    <p:extLst>
+      <p:ext uri="{BB962C8B-B14F-4D97-AF65-F5344CB8AC3E}">
+        <p14:creationId xmlns:p14="http://schemas.microsoft.com/office/powerpoint/2010/main" val="2763118565"/>
+      </p:ext>
+    </p:extLst>
+  </p:cSld>
+  <p:clrMapOvr>
+    <a:masterClrMapping/>
+  </p:clrMapOvr>
+</p:sld>
+</file>
+
+<file path=ppt/slides/slide6.xml><?xml version="1.0" encoding="utf-8"?>
+<p:sld xmlns:a="http://schemas.openxmlformats.org/drawingml/2006/main" xmlns:r="http://schemas.openxmlformats.org/officeDocument/2006/relationships" xmlns:p="http://schemas.openxmlformats.org/presentationml/2006/main">
+  <p:cSld>
+    <p:spTree>
+      <p:nvGrpSpPr>
+        <p:cNvPr id="1" name=""/>
+        <p:cNvGrpSpPr/>
+        <p:nvPr/>
+      </p:nvGrpSpPr>
+      <p:grpSpPr>
+        <a:xfrm>
+          <a:off x="0" y="0"/>
+          <a:ext cx="0" cy="0"/>
+          <a:chOff x="0" y="0"/>
+          <a:chExt cx="0" cy="0"/>
+        </a:xfrm>
+      </p:grpSpPr>
+      <p:sp>
+        <p:nvSpPr>
+          <p:cNvPr id="2" name="Title 1">
+            <a:extLst>
+              <a:ext uri="{FF2B5EF4-FFF2-40B4-BE49-F238E27FC236}">
                 <a16:creationId xmlns:a16="http://schemas.microsoft.com/office/drawing/2014/main" id="{644BA8BB-E9FA-DF45-80BE-3426CDAC807B}"/>
               </a:ext>
             </a:extLst>
@@ -4067,7 +4395,7 @@
 </p:sld>
 </file>
 
-<file path=ppt/slides/slide6.xml><?xml version="1.0" encoding="utf-8"?>
+<file path=ppt/slides/slide7.xml><?xml version="1.0" encoding="utf-8"?>
 <p:sld xmlns:a="http://schemas.openxmlformats.org/drawingml/2006/main" xmlns:r="http://schemas.openxmlformats.org/officeDocument/2006/relationships" xmlns:p="http://schemas.openxmlformats.org/presentationml/2006/main">
   <p:cSld>
     <p:spTree>
@@ -4238,169 +4566,6 @@
 </p:sld>
 </file>
 
-<file path=ppt/slides/slide7.xml><?xml version="1.0" encoding="utf-8"?>
-<p:sld xmlns:a="http://schemas.openxmlformats.org/drawingml/2006/main" xmlns:r="http://schemas.openxmlformats.org/officeDocument/2006/relationships" xmlns:p="http://schemas.openxmlformats.org/presentationml/2006/main">
-  <p:cSld>
-    <p:spTree>
-      <p:nvGrpSpPr>
-        <p:cNvPr id="1" name=""/>
-        <p:cNvGrpSpPr/>
-        <p:nvPr/>
-      </p:nvGrpSpPr>
-      <p:grpSpPr>
-        <a:xfrm>
-          <a:off x="0" y="0"/>
-          <a:ext cx="0" cy="0"/>
-          <a:chOff x="0" y="0"/>
-          <a:chExt cx="0" cy="0"/>
-        </a:xfrm>
-      </p:grpSpPr>
-      <p:sp>
-        <p:nvSpPr>
-          <p:cNvPr id="2" name="Title 1">
-            <a:extLst>
-              <a:ext uri="{FF2B5EF4-FFF2-40B4-BE49-F238E27FC236}">
-                <a16:creationId xmlns:a16="http://schemas.microsoft.com/office/drawing/2014/main" id="{02F0147B-0278-EE41-B11F-F9E8C037BFE4}"/>
-              </a:ext>
-            </a:extLst>
-          </p:cNvPr>
-          <p:cNvSpPr>
-            <a:spLocks noGrp="1"/>
-          </p:cNvSpPr>
-          <p:nvPr>
-            <p:ph type="title"/>
-          </p:nvPr>
-        </p:nvSpPr>
-        <p:spPr/>
-        <p:txBody>
-          <a:bodyPr/>
-          <a:lstStyle/>
-          <a:p>
-            <a:r>
-              <a:rPr lang="es-ES_tradnl" dirty="0"/>
-              <a:t>Min </a:t>
-            </a:r>
-            <a:r>
-              <a:rPr lang="es-ES_tradnl" dirty="0" err="1"/>
-              <a:t>max</a:t>
-            </a:r>
-            <a:r>
-              <a:rPr lang="es-ES_tradnl" dirty="0"/>
-              <a:t> </a:t>
-            </a:r>
-            <a:r>
-              <a:rPr lang="es-ES_tradnl" dirty="0" err="1"/>
-              <a:t>scaler</a:t>
-            </a:r>
-            <a:endParaRPr lang="es-ES_tradnl" dirty="0"/>
-          </a:p>
-        </p:txBody>
-      </p:sp>
-      <p:sp>
-        <p:nvSpPr>
-          <p:cNvPr id="3" name="Content Placeholder 2">
-            <a:extLst>
-              <a:ext uri="{FF2B5EF4-FFF2-40B4-BE49-F238E27FC236}">
-                <a16:creationId xmlns:a16="http://schemas.microsoft.com/office/drawing/2014/main" id="{09A7E385-3082-0749-83F9-A4598705A9CB}"/>
-              </a:ext>
-            </a:extLst>
-          </p:cNvPr>
-          <p:cNvSpPr>
-            <a:spLocks noGrp="1"/>
-          </p:cNvSpPr>
-          <p:nvPr>
-            <p:ph idx="1"/>
-          </p:nvPr>
-        </p:nvSpPr>
-        <p:spPr/>
-        <p:txBody>
-          <a:bodyPr/>
-          <a:lstStyle/>
-          <a:p>
-            <a:r>
-              <a:rPr lang="es-ES_tradnl" dirty="0"/>
-              <a:t>Aquí se implemento el min </a:t>
-            </a:r>
-            <a:r>
-              <a:rPr lang="es-ES_tradnl" dirty="0" err="1"/>
-              <a:t>max</a:t>
-            </a:r>
-            <a:r>
-              <a:rPr lang="es-ES_tradnl" dirty="0"/>
-              <a:t> </a:t>
-            </a:r>
-            <a:r>
-              <a:rPr lang="es-ES_tradnl" dirty="0" err="1"/>
-              <a:t>scaler</a:t>
-            </a:r>
-            <a:r>
-              <a:rPr lang="es-ES_tradnl" dirty="0"/>
-              <a:t> de </a:t>
-            </a:r>
-            <a:r>
-              <a:rPr lang="es-ES_tradnl" dirty="0" err="1"/>
-              <a:t>sklearn</a:t>
-            </a:r>
-            <a:r>
-              <a:rPr lang="es-ES_tradnl" dirty="0"/>
-              <a:t>, después se correo el testeo y se consiguió un resultado de  0.8935406698564593</a:t>
-            </a:r>
-          </a:p>
-          <a:p>
-            <a:r>
-              <a:rPr lang="es-ES_tradnl" dirty="0" err="1"/>
-              <a:t>Tambien</a:t>
-            </a:r>
-            <a:r>
-              <a:rPr lang="es-ES_tradnl" dirty="0"/>
-              <a:t> se borraron columnas con valores únicos </a:t>
-            </a:r>
-          </a:p>
-        </p:txBody>
-      </p:sp>
-      <p:pic>
-        <p:nvPicPr>
-          <p:cNvPr id="5" name="Picture 4">
-            <a:extLst>
-              <a:ext uri="{FF2B5EF4-FFF2-40B4-BE49-F238E27FC236}">
-                <a16:creationId xmlns:a16="http://schemas.microsoft.com/office/drawing/2014/main" id="{B8168993-6E46-5044-B284-DF9E010B6FD4}"/>
-              </a:ext>
-            </a:extLst>
-          </p:cNvPr>
-          <p:cNvPicPr>
-            <a:picLocks noChangeAspect="1"/>
-          </p:cNvPicPr>
-          <p:nvPr/>
-        </p:nvPicPr>
-        <p:blipFill>
-          <a:blip r:embed="rId2"/>
-          <a:stretch>
-            <a:fillRect/>
-          </a:stretch>
-        </p:blipFill>
-        <p:spPr>
-          <a:xfrm>
-            <a:off x="1719295" y="4346388"/>
-            <a:ext cx="2984500" cy="1409700"/>
-          </a:xfrm>
-          <a:prstGeom prst="rect">
-            <a:avLst/>
-          </a:prstGeom>
-        </p:spPr>
-      </p:pic>
-    </p:spTree>
-    <p:extLst>
-      <p:ext uri="{BB962C8B-B14F-4D97-AF65-F5344CB8AC3E}">
-        <p14:creationId xmlns:p14="http://schemas.microsoft.com/office/powerpoint/2010/main" val="3876380840"/>
-      </p:ext>
-    </p:extLst>
-  </p:cSld>
-  <p:clrMapOvr>
-    <a:masterClrMapping/>
-  </p:clrMapOvr>
-</p:sld>
-</file>
-
 <file path=ppt/slides/slide8.xml><?xml version="1.0" encoding="utf-8"?>
 <p:sld xmlns:a="http://schemas.openxmlformats.org/drawingml/2006/main" xmlns:r="http://schemas.openxmlformats.org/officeDocument/2006/relationships" xmlns:p="http://schemas.openxmlformats.org/presentationml/2006/main">
   <p:cSld>
@@ -4423,7 +4588,7 @@
           <p:cNvPr id="2" name="Title 1">
             <a:extLst>
               <a:ext uri="{FF2B5EF4-FFF2-40B4-BE49-F238E27FC236}">
-                <a16:creationId xmlns:a16="http://schemas.microsoft.com/office/drawing/2014/main" id="{DF646E62-D40B-974C-8013-6BC416D274F3}"/>
+                <a16:creationId xmlns:a16="http://schemas.microsoft.com/office/drawing/2014/main" id="{8BA80A1E-60A8-DC44-AA85-9CD8A26F5A87}"/>
               </a:ext>
             </a:extLst>
           </p:cNvPr>
@@ -4439,14 +4604,128 @@
           <a:bodyPr/>
           <a:lstStyle/>
           <a:p>
+            <a:endParaRPr lang="es-ES_tradnl"/>
+          </a:p>
+        </p:txBody>
+      </p:sp>
+      <p:sp>
+        <p:nvSpPr>
+          <p:cNvPr id="3" name="Content Placeholder 2">
+            <a:extLst>
+              <a:ext uri="{FF2B5EF4-FFF2-40B4-BE49-F238E27FC236}">
+                <a16:creationId xmlns:a16="http://schemas.microsoft.com/office/drawing/2014/main" id="{57764BE1-FA4E-B048-833F-D36FF98586FF}"/>
+              </a:ext>
+            </a:extLst>
+          </p:cNvPr>
+          <p:cNvSpPr>
+            <a:spLocks noGrp="1"/>
+          </p:cNvSpPr>
+          <p:nvPr>
+            <p:ph idx="1"/>
+          </p:nvPr>
+        </p:nvSpPr>
+        <p:spPr/>
+        <p:txBody>
+          <a:bodyPr/>
+          <a:lstStyle/>
+          <a:p>
+            <a:r>
+              <a:rPr lang="es-ES_tradnl" dirty="0"/>
+              <a:t>Para el </a:t>
+            </a:r>
             <a:r>
               <a:rPr lang="es-ES_tradnl" dirty="0" err="1"/>
-              <a:t>Metodos</a:t>
-            </a:r>
-            <a:r>
-              <a:rPr lang="es-ES_tradnl" dirty="0"/>
-              <a:t> ensamble </a:t>
-            </a:r>
+              <a:t>feature</a:t>
+            </a:r>
+            <a:r>
+              <a:rPr lang="es-ES_tradnl" dirty="0"/>
+              <a:t> </a:t>
+            </a:r>
+            <a:r>
+              <a:rPr lang="es-ES_tradnl" dirty="0" err="1"/>
+              <a:t>selection</a:t>
+            </a:r>
+            <a:r>
+              <a:rPr lang="es-ES_tradnl" dirty="0"/>
+              <a:t> comencé con un problema, debido a que me había faltado quitar las clases que tenían valores únicos, por lo que me estaba mostrando scores altísimos. </a:t>
+            </a:r>
+          </a:p>
+          <a:p>
+            <a:r>
+              <a:rPr lang="es-ES_tradnl" dirty="0"/>
+              <a:t>Después de borrarlos, me mostro scores mas normales por lo que puse que agarrara solo las mejores 5 clases</a:t>
+            </a:r>
+          </a:p>
+        </p:txBody>
+      </p:sp>
+    </p:spTree>
+    <p:extLst>
+      <p:ext uri="{BB962C8B-B14F-4D97-AF65-F5344CB8AC3E}">
+        <p14:creationId xmlns:p14="http://schemas.microsoft.com/office/powerpoint/2010/main" val="3332257183"/>
+      </p:ext>
+    </p:extLst>
+  </p:cSld>
+  <p:clrMapOvr>
+    <a:masterClrMapping/>
+  </p:clrMapOvr>
+</p:sld>
+</file>
+
+<file path=ppt/slides/slide9.xml><?xml version="1.0" encoding="utf-8"?>
+<p:sld xmlns:a="http://schemas.openxmlformats.org/drawingml/2006/main" xmlns:r="http://schemas.openxmlformats.org/officeDocument/2006/relationships" xmlns:p="http://schemas.openxmlformats.org/presentationml/2006/main">
+  <p:cSld>
+    <p:spTree>
+      <p:nvGrpSpPr>
+        <p:cNvPr id="1" name=""/>
+        <p:cNvGrpSpPr/>
+        <p:nvPr/>
+      </p:nvGrpSpPr>
+      <p:grpSpPr>
+        <a:xfrm>
+          <a:off x="0" y="0"/>
+          <a:ext cx="0" cy="0"/>
+          <a:chOff x="0" y="0"/>
+          <a:chExt cx="0" cy="0"/>
+        </a:xfrm>
+      </p:grpSpPr>
+      <p:sp>
+        <p:nvSpPr>
+          <p:cNvPr id="2" name="Title 1">
+            <a:extLst>
+              <a:ext uri="{FF2B5EF4-FFF2-40B4-BE49-F238E27FC236}">
+                <a16:creationId xmlns:a16="http://schemas.microsoft.com/office/drawing/2014/main" id="{02F0147B-0278-EE41-B11F-F9E8C037BFE4}"/>
+              </a:ext>
+            </a:extLst>
+          </p:cNvPr>
+          <p:cNvSpPr>
+            <a:spLocks noGrp="1"/>
+          </p:cNvSpPr>
+          <p:nvPr>
+            <p:ph type="title"/>
+          </p:nvPr>
+        </p:nvSpPr>
+        <p:spPr/>
+        <p:txBody>
+          <a:bodyPr/>
+          <a:lstStyle/>
+          <a:p>
+            <a:r>
+              <a:rPr lang="es-ES_tradnl" dirty="0"/>
+              <a:t>Min </a:t>
+            </a:r>
+            <a:r>
+              <a:rPr lang="es-ES_tradnl" dirty="0" err="1"/>
+              <a:t>max</a:t>
+            </a:r>
+            <a:r>
+              <a:rPr lang="es-ES_tradnl" dirty="0"/>
+              <a:t> </a:t>
+            </a:r>
+            <a:r>
+              <a:rPr lang="es-ES_tradnl" dirty="0" err="1"/>
+              <a:t>scaler</a:t>
+            </a:r>
+            <a:endParaRPr lang="es-ES_tradnl" dirty="0"/>
           </a:p>
         </p:txBody>
       </p:sp>
@@ -4455,7 +4734,7 @@
           <p:cNvPr id="3" name="Content Placeholder 2">
             <a:extLst>
               <a:ext uri="{FF2B5EF4-FFF2-40B4-BE49-F238E27FC236}">
-                <a16:creationId xmlns:a16="http://schemas.microsoft.com/office/drawing/2014/main" id="{F593C994-D8B0-B846-AE93-78B18623CCAB}"/>
+                <a16:creationId xmlns:a16="http://schemas.microsoft.com/office/drawing/2014/main" id="{09A7E385-3082-0749-83F9-A4598705A9CB}"/>
               </a:ext>
             </a:extLst>
           </p:cNvPr>
@@ -4473,62 +4752,51 @@
           <a:p>
             <a:r>
               <a:rPr lang="es-ES_tradnl" dirty="0"/>
-              <a:t>Se </a:t>
+              <a:t>Se utilizo el atributo </a:t>
             </a:r>
             <a:r>
               <a:rPr lang="es-ES_tradnl" dirty="0" err="1"/>
-              <a:t>agragaron</a:t>
-            </a:r>
-            <a:r>
-              <a:rPr lang="es-ES_tradnl" dirty="0"/>
-              <a:t> métodos de redes neuronales MLP, </a:t>
-            </a:r>
+              <a:t>fit_transform</a:t>
+            </a:r>
+            <a:r>
+              <a:rPr lang="es-ES_tradnl" dirty="0"/>
+              <a:t> para normalizar los datos, dándole un rango de 0,1 y nos dio un score de 0.8911483253588517</a:t>
+            </a:r>
+          </a:p>
+          <a:p>
             <a:r>
               <a:rPr lang="es-ES_tradnl" dirty="0" err="1"/>
-              <a:t>adaBoost</a:t>
-            </a:r>
-            <a:r>
-              <a:rPr lang="es-ES_tradnl" dirty="0"/>
-              <a:t>, </a:t>
+              <a:t>Tambien</a:t>
+            </a:r>
+            <a:r>
+              <a:rPr lang="es-ES_tradnl" dirty="0"/>
+              <a:t> se borraron columnas con valores únicos y se le dio un </a:t>
             </a:r>
             <a:r>
               <a:rPr lang="es-ES_tradnl" dirty="0" err="1"/>
-              <a:t>Bagging</a:t>
-            </a:r>
-            <a:r>
-              <a:rPr lang="es-ES_tradnl" dirty="0"/>
-              <a:t> y </a:t>
+              <a:t>max_depth</a:t>
+            </a:r>
+            <a:r>
+              <a:rPr lang="es-ES_tradnl" dirty="0"/>
+              <a:t> de 5 al árbol de decisión haciendo que agarre menos características mejorando el score 0.9163533834586466 con el </a:t>
             </a:r>
             <a:r>
               <a:rPr lang="es-ES_tradnl" dirty="0" err="1"/>
-              <a:t>random</a:t>
-            </a:r>
-            <a:r>
-              <a:rPr lang="es-ES_tradnl" dirty="0"/>
-              <a:t> </a:t>
-            </a:r>
-            <a:r>
-              <a:rPr lang="es-ES_tradnl" dirty="0" err="1"/>
-              <a:t>forest</a:t>
-            </a:r>
-            <a:r>
-              <a:rPr lang="es-ES_tradnl" dirty="0"/>
-              <a:t> obteniendo estos </a:t>
-            </a:r>
-            <a:r>
-              <a:rPr lang="es-ES_tradnl"/>
-              <a:t>reultados</a:t>
-            </a:r>
-            <a:endParaRPr lang="es-ES_tradnl" dirty="0"/>
+              <a:t>maxdepth</a:t>
+            </a:r>
+            <a:r>
+              <a:rPr lang="es-ES_tradnl" dirty="0"/>
+              <a:t>=7 0.9174641148325359</a:t>
+            </a:r>
           </a:p>
         </p:txBody>
       </p:sp>
       <p:pic>
         <p:nvPicPr>
-          <p:cNvPr id="5" name="Picture 4">
-            <a:extLst>
-              <a:ext uri="{FF2B5EF4-FFF2-40B4-BE49-F238E27FC236}">
-                <a16:creationId xmlns:a16="http://schemas.microsoft.com/office/drawing/2014/main" id="{C7A71771-0873-6248-98AC-23218E0D780F}"/>
+          <p:cNvPr id="6" name="Picture 5">
+            <a:extLst>
+              <a:ext uri="{FF2B5EF4-FFF2-40B4-BE49-F238E27FC236}">
+                <a16:creationId xmlns:a16="http://schemas.microsoft.com/office/drawing/2014/main" id="{63D42FBD-AA70-4E49-BDF1-B8B3741D9407}"/>
               </a:ext>
             </a:extLst>
           </p:cNvPr>
@@ -4545,8 +4813,8 @@
         </p:blipFill>
         <p:spPr>
           <a:xfrm>
-            <a:off x="1019362" y="2904564"/>
-            <a:ext cx="5332625" cy="3145865"/>
+            <a:off x="838200" y="4394994"/>
+            <a:ext cx="5092700" cy="2197100"/>
           </a:xfrm>
           <a:prstGeom prst="rect">
             <a:avLst/>
@@ -4555,10 +4823,10 @@
       </p:pic>
       <p:pic>
         <p:nvPicPr>
-          <p:cNvPr id="7" name="Picture 6">
-            <a:extLst>
-              <a:ext uri="{FF2B5EF4-FFF2-40B4-BE49-F238E27FC236}">
-                <a16:creationId xmlns:a16="http://schemas.microsoft.com/office/drawing/2014/main" id="{85E58A1D-1225-AA47-AC6D-AB9952C5D03B}"/>
+          <p:cNvPr id="8" name="Picture 7">
+            <a:extLst>
+              <a:ext uri="{FF2B5EF4-FFF2-40B4-BE49-F238E27FC236}">
+                <a16:creationId xmlns:a16="http://schemas.microsoft.com/office/drawing/2014/main" id="{7F7D13E8-8709-8547-97D3-22996BB4D85A}"/>
               </a:ext>
             </a:extLst>
           </p:cNvPr>
@@ -4575,8 +4843,8 @@
         </p:blipFill>
         <p:spPr>
           <a:xfrm>
-            <a:off x="6803838" y="3604186"/>
-            <a:ext cx="4368800" cy="1155700"/>
+            <a:off x="6292850" y="4001294"/>
+            <a:ext cx="5181600" cy="2590800"/>
           </a:xfrm>
           <a:prstGeom prst="rect">
             <a:avLst/>
@@ -4586,7 +4854,7 @@
     </p:spTree>
     <p:extLst>
       <p:ext uri="{BB962C8B-B14F-4D97-AF65-F5344CB8AC3E}">
-        <p14:creationId xmlns:p14="http://schemas.microsoft.com/office/powerpoint/2010/main" val="3413398631"/>
+        <p14:creationId xmlns:p14="http://schemas.microsoft.com/office/powerpoint/2010/main" val="3876380840"/>
       </p:ext>
     </p:extLst>
   </p:cSld>

</xml_diff>